<commit_message>
removed wrong object. update figure and activity preface
</commit_message>
<xml_diff>
--- a/figures/resources/script_variables.pptx
+++ b/figures/resources/script_variables.pptx
@@ -5,7 +5,8 @@
     <p:sldMasterId id="2147483648" r:id="rId1"/>
   </p:sldMasterIdLst>
   <p:sldIdLst>
-    <p:sldId id="256" r:id="rId2"/>
+    <p:sldId id="258" r:id="rId2"/>
+    <p:sldId id="256" r:id="rId3"/>
   </p:sldIdLst>
   <p:sldSz cx="12192000" cy="6858000"/>
   <p:notesSz cx="6858000" cy="9144000"/>
@@ -104,6 +105,11 @@
       </a:defRPr>
     </a:lvl9pPr>
   </p:defaultTextStyle>
+  <p:extLst>
+    <p:ext uri="{EFAFB233-063F-42B5-8137-9DF3F51BA10A}">
+      <p15:sldGuideLst xmlns:p15="http://schemas.microsoft.com/office/powerpoint/2012/main"/>
+    </p:ext>
+  </p:extLst>
 </p:presentation>
 </file>
 
@@ -256,7 +262,7 @@
           <a:p>
             <a:fld id="{7514DB4D-0993-EB44-A931-A227895C0740}" type="datetimeFigureOut">
               <a:rPr lang="en-DE" smtClean="0"/>
-              <a:t>20.12.21</a:t>
+              <a:t>20.03.22</a:t>
             </a:fld>
             <a:endParaRPr lang="en-DE"/>
           </a:p>
@@ -456,7 +462,7 @@
           <a:p>
             <a:fld id="{7514DB4D-0993-EB44-A931-A227895C0740}" type="datetimeFigureOut">
               <a:rPr lang="en-DE" smtClean="0"/>
-              <a:t>20.12.21</a:t>
+              <a:t>20.03.22</a:t>
             </a:fld>
             <a:endParaRPr lang="en-DE"/>
           </a:p>
@@ -666,7 +672,7 @@
           <a:p>
             <a:fld id="{7514DB4D-0993-EB44-A931-A227895C0740}" type="datetimeFigureOut">
               <a:rPr lang="en-DE" smtClean="0"/>
-              <a:t>20.12.21</a:t>
+              <a:t>20.03.22</a:t>
             </a:fld>
             <a:endParaRPr lang="en-DE"/>
           </a:p>
@@ -866,7 +872,7 @@
           <a:p>
             <a:fld id="{7514DB4D-0993-EB44-A931-A227895C0740}" type="datetimeFigureOut">
               <a:rPr lang="en-DE" smtClean="0"/>
-              <a:t>20.12.21</a:t>
+              <a:t>20.03.22</a:t>
             </a:fld>
             <a:endParaRPr lang="en-DE"/>
           </a:p>
@@ -1142,7 +1148,7 @@
           <a:p>
             <a:fld id="{7514DB4D-0993-EB44-A931-A227895C0740}" type="datetimeFigureOut">
               <a:rPr lang="en-DE" smtClean="0"/>
-              <a:t>20.12.21</a:t>
+              <a:t>20.03.22</a:t>
             </a:fld>
             <a:endParaRPr lang="en-DE"/>
           </a:p>
@@ -1410,7 +1416,7 @@
           <a:p>
             <a:fld id="{7514DB4D-0993-EB44-A931-A227895C0740}" type="datetimeFigureOut">
               <a:rPr lang="en-DE" smtClean="0"/>
-              <a:t>20.12.21</a:t>
+              <a:t>20.03.22</a:t>
             </a:fld>
             <a:endParaRPr lang="en-DE"/>
           </a:p>
@@ -1825,7 +1831,7 @@
           <a:p>
             <a:fld id="{7514DB4D-0993-EB44-A931-A227895C0740}" type="datetimeFigureOut">
               <a:rPr lang="en-DE" smtClean="0"/>
-              <a:t>20.12.21</a:t>
+              <a:t>20.03.22</a:t>
             </a:fld>
             <a:endParaRPr lang="en-DE"/>
           </a:p>
@@ -1967,7 +1973,7 @@
           <a:p>
             <a:fld id="{7514DB4D-0993-EB44-A931-A227895C0740}" type="datetimeFigureOut">
               <a:rPr lang="en-DE" smtClean="0"/>
-              <a:t>20.12.21</a:t>
+              <a:t>20.03.22</a:t>
             </a:fld>
             <a:endParaRPr lang="en-DE"/>
           </a:p>
@@ -2080,7 +2086,7 @@
           <a:p>
             <a:fld id="{7514DB4D-0993-EB44-A931-A227895C0740}" type="datetimeFigureOut">
               <a:rPr lang="en-DE" smtClean="0"/>
-              <a:t>20.12.21</a:t>
+              <a:t>20.03.22</a:t>
             </a:fld>
             <a:endParaRPr lang="en-DE"/>
           </a:p>
@@ -2393,7 +2399,7 @@
           <a:p>
             <a:fld id="{7514DB4D-0993-EB44-A931-A227895C0740}" type="datetimeFigureOut">
               <a:rPr lang="en-DE" smtClean="0"/>
-              <a:t>20.12.21</a:t>
+              <a:t>20.03.22</a:t>
             </a:fld>
             <a:endParaRPr lang="en-DE"/>
           </a:p>
@@ -2682,7 +2688,7 @@
           <a:p>
             <a:fld id="{7514DB4D-0993-EB44-A931-A227895C0740}" type="datetimeFigureOut">
               <a:rPr lang="en-DE" smtClean="0"/>
-              <a:t>20.12.21</a:t>
+              <a:t>20.03.22</a:t>
             </a:fld>
             <a:endParaRPr lang="en-DE"/>
           </a:p>
@@ -2925,7 +2931,7 @@
           <a:p>
             <a:fld id="{7514DB4D-0993-EB44-A931-A227895C0740}" type="datetimeFigureOut">
               <a:rPr lang="en-DE" smtClean="0"/>
-              <a:t>20.12.21</a:t>
+              <a:t>20.03.22</a:t>
             </a:fld>
             <a:endParaRPr lang="en-DE"/>
           </a:p>
@@ -3326,6 +3332,1052 @@
 </file>
 
 <file path=ppt/slides/slide1.xml><?xml version="1.0" encoding="utf-8"?>
+<p:sld xmlns:a="http://schemas.openxmlformats.org/drawingml/2006/main" xmlns:r="http://schemas.openxmlformats.org/officeDocument/2006/relationships" xmlns:p="http://schemas.openxmlformats.org/presentationml/2006/main">
+  <p:cSld>
+    <p:spTree>
+      <p:nvGrpSpPr>
+        <p:cNvPr id="1" name=""/>
+        <p:cNvGrpSpPr/>
+        <p:nvPr/>
+      </p:nvGrpSpPr>
+      <p:grpSpPr>
+        <a:xfrm>
+          <a:off x="0" y="0"/>
+          <a:ext cx="0" cy="0"/>
+          <a:chOff x="0" y="0"/>
+          <a:chExt cx="0" cy="0"/>
+        </a:xfrm>
+      </p:grpSpPr>
+      <p:sp>
+        <p:nvSpPr>
+          <p:cNvPr id="4" name="TextBox 3">
+            <a:extLst>
+              <a:ext uri="{FF2B5EF4-FFF2-40B4-BE49-F238E27FC236}">
+                <a16:creationId xmlns:a16="http://schemas.microsoft.com/office/drawing/2014/main" id="{2B85B549-DCCF-824B-8727-A01E20EB712C}"/>
+              </a:ext>
+            </a:extLst>
+          </p:cNvPr>
+          <p:cNvSpPr txBox="1"/>
+          <p:nvPr/>
+        </p:nvSpPr>
+        <p:spPr>
+          <a:xfrm>
+            <a:off x="3030160" y="752077"/>
+            <a:ext cx="4025548" cy="369332"/>
+          </a:xfrm>
+          <a:prstGeom prst="rect">
+            <a:avLst/>
+          </a:prstGeom>
+          <a:noFill/>
+        </p:spPr>
+        <p:txBody>
+          <a:bodyPr wrap="square" rtlCol="0">
+            <a:spAutoFit/>
+          </a:bodyPr>
+          <a:lstStyle/>
+          <a:p>
+            <a:r>
+              <a:rPr lang="en-GB" dirty="0"/>
+              <a:t>e.g.   </a:t>
+            </a:r>
+            <a:r>
+              <a:rPr lang="en-GB" dirty="0">
+                <a:solidFill>
+                  <a:schemeClr val="accent1"/>
+                </a:solidFill>
+              </a:rPr>
+              <a:t>int      </a:t>
+            </a:r>
+            <a:r>
+              <a:rPr lang="en-GB" dirty="0" err="1">
+                <a:solidFill>
+                  <a:srgbClr val="00B050"/>
+                </a:solidFill>
+              </a:rPr>
+              <a:t>inputNumber</a:t>
+            </a:r>
+            <a:r>
+              <a:rPr lang="en-GB" dirty="0">
+                <a:solidFill>
+                  <a:schemeClr val="accent1"/>
+                </a:solidFill>
+              </a:rPr>
+              <a:t>  </a:t>
+            </a:r>
+            <a:r>
+              <a:rPr lang="en-GB" dirty="0"/>
+              <a:t>=</a:t>
+            </a:r>
+            <a:r>
+              <a:rPr lang="en-GB" dirty="0">
+                <a:solidFill>
+                  <a:srgbClr val="00B050"/>
+                </a:solidFill>
+              </a:rPr>
+              <a:t>     </a:t>
+            </a:r>
+            <a:r>
+              <a:rPr lang="en-GB" dirty="0">
+                <a:solidFill>
+                  <a:srgbClr val="FF0000"/>
+                </a:solidFill>
+              </a:rPr>
+              <a:t>42</a:t>
+            </a:r>
+            <a:endParaRPr lang="en-DE" dirty="0"/>
+          </a:p>
+        </p:txBody>
+      </p:sp>
+      <p:sp>
+        <p:nvSpPr>
+          <p:cNvPr id="11" name="TextBox 10">
+            <a:extLst>
+              <a:ext uri="{FF2B5EF4-FFF2-40B4-BE49-F238E27FC236}">
+                <a16:creationId xmlns:a16="http://schemas.microsoft.com/office/drawing/2014/main" id="{2ADC0A77-CADD-BE44-806F-AFE9A60D387B}"/>
+              </a:ext>
+            </a:extLst>
+          </p:cNvPr>
+          <p:cNvSpPr txBox="1"/>
+          <p:nvPr/>
+        </p:nvSpPr>
+        <p:spPr>
+          <a:xfrm>
+            <a:off x="3360358" y="396165"/>
+            <a:ext cx="831499" cy="369332"/>
+          </a:xfrm>
+          <a:prstGeom prst="rect">
+            <a:avLst/>
+          </a:prstGeom>
+          <a:noFill/>
+        </p:spPr>
+        <p:txBody>
+          <a:bodyPr wrap="square" rtlCol="0">
+            <a:spAutoFit/>
+          </a:bodyPr>
+          <a:lstStyle/>
+          <a:p>
+            <a:r>
+              <a:rPr lang="en-DE" dirty="0">
+                <a:solidFill>
+                  <a:schemeClr val="accent1"/>
+                </a:solidFill>
+              </a:rPr>
+              <a:t>type</a:t>
+            </a:r>
+          </a:p>
+        </p:txBody>
+      </p:sp>
+      <p:sp>
+        <p:nvSpPr>
+          <p:cNvPr id="12" name="TextBox 11">
+            <a:extLst>
+              <a:ext uri="{FF2B5EF4-FFF2-40B4-BE49-F238E27FC236}">
+                <a16:creationId xmlns:a16="http://schemas.microsoft.com/office/drawing/2014/main" id="{BF051A14-CFEB-944B-8AC7-63EA1A6C91CF}"/>
+              </a:ext>
+            </a:extLst>
+          </p:cNvPr>
+          <p:cNvSpPr txBox="1"/>
+          <p:nvPr/>
+        </p:nvSpPr>
+        <p:spPr>
+          <a:xfrm>
+            <a:off x="5622615" y="396165"/>
+            <a:ext cx="1178959" cy="369332"/>
+          </a:xfrm>
+          <a:prstGeom prst="rect">
+            <a:avLst/>
+          </a:prstGeom>
+          <a:noFill/>
+        </p:spPr>
+        <p:txBody>
+          <a:bodyPr wrap="square" rtlCol="0">
+            <a:spAutoFit/>
+          </a:bodyPr>
+          <a:lstStyle/>
+          <a:p>
+            <a:r>
+              <a:rPr lang="en-DE" dirty="0">
+                <a:solidFill>
+                  <a:srgbClr val="FF0000"/>
+                </a:solidFill>
+              </a:rPr>
+              <a:t>   value</a:t>
+            </a:r>
+          </a:p>
+        </p:txBody>
+      </p:sp>
+      <p:sp>
+        <p:nvSpPr>
+          <p:cNvPr id="13" name="TextBox 12">
+            <a:extLst>
+              <a:ext uri="{FF2B5EF4-FFF2-40B4-BE49-F238E27FC236}">
+                <a16:creationId xmlns:a16="http://schemas.microsoft.com/office/drawing/2014/main" id="{D05CE433-07D3-A246-9E85-DD0A2F50C40D}"/>
+              </a:ext>
+            </a:extLst>
+          </p:cNvPr>
+          <p:cNvSpPr txBox="1"/>
+          <p:nvPr/>
+        </p:nvSpPr>
+        <p:spPr>
+          <a:xfrm>
+            <a:off x="4594554" y="396165"/>
+            <a:ext cx="910326" cy="369332"/>
+          </a:xfrm>
+          <a:prstGeom prst="rect">
+            <a:avLst/>
+          </a:prstGeom>
+          <a:noFill/>
+        </p:spPr>
+        <p:txBody>
+          <a:bodyPr wrap="square" rtlCol="0">
+            <a:spAutoFit/>
+          </a:bodyPr>
+          <a:lstStyle/>
+          <a:p>
+            <a:r>
+              <a:rPr lang="en-DE" dirty="0">
+                <a:solidFill>
+                  <a:srgbClr val="00B050"/>
+                </a:solidFill>
+              </a:rPr>
+              <a:t>name</a:t>
+            </a:r>
+          </a:p>
+        </p:txBody>
+      </p:sp>
+      <p:sp>
+        <p:nvSpPr>
+          <p:cNvPr id="16" name="TextBox 15">
+            <a:extLst>
+              <a:ext uri="{FF2B5EF4-FFF2-40B4-BE49-F238E27FC236}">
+                <a16:creationId xmlns:a16="http://schemas.microsoft.com/office/drawing/2014/main" id="{BF798EBC-33CD-9441-8C5E-B3AD0908E691}"/>
+              </a:ext>
+            </a:extLst>
+          </p:cNvPr>
+          <p:cNvSpPr txBox="1"/>
+          <p:nvPr/>
+        </p:nvSpPr>
+        <p:spPr>
+          <a:xfrm>
+            <a:off x="2444870" y="3578126"/>
+            <a:ext cx="1602613" cy="369332"/>
+          </a:xfrm>
+          <a:prstGeom prst="rect">
+            <a:avLst/>
+          </a:prstGeom>
+          <a:noFill/>
+        </p:spPr>
+        <p:txBody>
+          <a:bodyPr wrap="square" rtlCol="0">
+            <a:spAutoFit/>
+          </a:bodyPr>
+          <a:lstStyle/>
+          <a:p>
+            <a:r>
+              <a:rPr lang="en-DE" dirty="0">
+                <a:solidFill>
+                  <a:srgbClr val="00B050"/>
+                </a:solidFill>
+              </a:rPr>
+              <a:t>inputNumber</a:t>
+            </a:r>
+          </a:p>
+        </p:txBody>
+      </p:sp>
+      <p:sp>
+        <p:nvSpPr>
+          <p:cNvPr id="17" name="TextBox 16">
+            <a:extLst>
+              <a:ext uri="{FF2B5EF4-FFF2-40B4-BE49-F238E27FC236}">
+                <a16:creationId xmlns:a16="http://schemas.microsoft.com/office/drawing/2014/main" id="{CA0C8288-33D7-3849-8D59-507DE806DD0A}"/>
+              </a:ext>
+            </a:extLst>
+          </p:cNvPr>
+          <p:cNvSpPr txBox="1"/>
+          <p:nvPr/>
+        </p:nvSpPr>
+        <p:spPr>
+          <a:xfrm>
+            <a:off x="2174711" y="1923619"/>
+            <a:ext cx="633715" cy="369332"/>
+          </a:xfrm>
+          <a:prstGeom prst="rect">
+            <a:avLst/>
+          </a:prstGeom>
+          <a:noFill/>
+        </p:spPr>
+        <p:txBody>
+          <a:bodyPr wrap="square" rtlCol="0">
+            <a:spAutoFit/>
+          </a:bodyPr>
+          <a:lstStyle/>
+          <a:p>
+            <a:r>
+              <a:rPr lang="en-DE" dirty="0">
+                <a:solidFill>
+                  <a:srgbClr val="FF0000"/>
+                </a:solidFill>
+              </a:rPr>
+              <a:t>42</a:t>
+            </a:r>
+          </a:p>
+        </p:txBody>
+      </p:sp>
+      <p:sp>
+        <p:nvSpPr>
+          <p:cNvPr id="30" name="TextBox 29">
+            <a:extLst>
+              <a:ext uri="{FF2B5EF4-FFF2-40B4-BE49-F238E27FC236}">
+                <a16:creationId xmlns:a16="http://schemas.microsoft.com/office/drawing/2014/main" id="{10E4FE49-6B58-174F-9D78-FA0B4C856192}"/>
+              </a:ext>
+            </a:extLst>
+          </p:cNvPr>
+          <p:cNvSpPr txBox="1"/>
+          <p:nvPr/>
+        </p:nvSpPr>
+        <p:spPr>
+          <a:xfrm>
+            <a:off x="4191858" y="3578126"/>
+            <a:ext cx="3036846" cy="369332"/>
+          </a:xfrm>
+          <a:prstGeom prst="rect">
+            <a:avLst/>
+          </a:prstGeom>
+          <a:noFill/>
+        </p:spPr>
+        <p:txBody>
+          <a:bodyPr wrap="square" rtlCol="0">
+            <a:spAutoFit/>
+          </a:bodyPr>
+          <a:lstStyle/>
+          <a:p>
+            <a:r>
+              <a:rPr lang="en-US" dirty="0" err="1">
+                <a:solidFill>
+                  <a:srgbClr val="00B050"/>
+                </a:solidFill>
+              </a:rPr>
+              <a:t>greetingsFormula</a:t>
+            </a:r>
+            <a:endParaRPr lang="en-DE" dirty="0">
+              <a:solidFill>
+                <a:srgbClr val="00B050"/>
+              </a:solidFill>
+            </a:endParaRPr>
+          </a:p>
+        </p:txBody>
+      </p:sp>
+      <p:sp>
+        <p:nvSpPr>
+          <p:cNvPr id="5" name="Cube 4">
+            <a:extLst>
+              <a:ext uri="{FF2B5EF4-FFF2-40B4-BE49-F238E27FC236}">
+                <a16:creationId xmlns:a16="http://schemas.microsoft.com/office/drawing/2014/main" id="{A3917C94-6C8F-8140-B3B3-124FD2A84D21}"/>
+              </a:ext>
+            </a:extLst>
+          </p:cNvPr>
+          <p:cNvSpPr/>
+          <p:nvPr/>
+        </p:nvSpPr>
+        <p:spPr>
+          <a:xfrm>
+            <a:off x="2679313" y="2552268"/>
+            <a:ext cx="1037190" cy="968768"/>
+          </a:xfrm>
+          <a:prstGeom prst="cube">
+            <a:avLst>
+              <a:gd name="adj" fmla="val 30249"/>
+            </a:avLst>
+          </a:prstGeom>
+        </p:spPr>
+        <p:style>
+          <a:lnRef idx="2">
+            <a:schemeClr val="accent1">
+              <a:shade val="50000"/>
+            </a:schemeClr>
+          </a:lnRef>
+          <a:fillRef idx="1">
+            <a:schemeClr val="accent1"/>
+          </a:fillRef>
+          <a:effectRef idx="0">
+            <a:schemeClr val="accent1"/>
+          </a:effectRef>
+          <a:fontRef idx="minor">
+            <a:schemeClr val="lt1"/>
+          </a:fontRef>
+        </p:style>
+        <p:txBody>
+          <a:bodyPr rtlCol="0" anchor="ctr"/>
+          <a:lstStyle/>
+          <a:p>
+            <a:pPr algn="ctr"/>
+            <a:endParaRPr lang="en-DE" dirty="0"/>
+          </a:p>
+        </p:txBody>
+      </p:sp>
+      <p:cxnSp>
+        <p:nvCxnSpPr>
+          <p:cNvPr id="8" name="Curved Connector 7">
+            <a:extLst>
+              <a:ext uri="{FF2B5EF4-FFF2-40B4-BE49-F238E27FC236}">
+                <a16:creationId xmlns:a16="http://schemas.microsoft.com/office/drawing/2014/main" id="{B612AAC0-3BE7-6043-9769-66586D0FB463}"/>
+              </a:ext>
+            </a:extLst>
+          </p:cNvPr>
+          <p:cNvCxnSpPr>
+            <a:cxnSpLocks/>
+          </p:cNvCxnSpPr>
+          <p:nvPr/>
+        </p:nvCxnSpPr>
+        <p:spPr>
+          <a:xfrm>
+            <a:off x="2641805" y="2108285"/>
+            <a:ext cx="546404" cy="560351"/>
+          </a:xfrm>
+          <a:prstGeom prst="curvedConnector2">
+            <a:avLst/>
+          </a:prstGeom>
+          <a:ln w="38100">
+            <a:solidFill>
+              <a:schemeClr val="tx1"/>
+            </a:solidFill>
+            <a:tailEnd type="triangle"/>
+          </a:ln>
+        </p:spPr>
+        <p:style>
+          <a:lnRef idx="1">
+            <a:schemeClr val="accent1"/>
+          </a:lnRef>
+          <a:fillRef idx="0">
+            <a:schemeClr val="accent1"/>
+          </a:fillRef>
+          <a:effectRef idx="0">
+            <a:schemeClr val="accent1"/>
+          </a:effectRef>
+          <a:fontRef idx="minor">
+            <a:schemeClr val="tx1"/>
+          </a:fontRef>
+        </p:style>
+      </p:cxnSp>
+      <p:sp>
+        <p:nvSpPr>
+          <p:cNvPr id="9" name="Can 8">
+            <a:extLst>
+              <a:ext uri="{FF2B5EF4-FFF2-40B4-BE49-F238E27FC236}">
+                <a16:creationId xmlns:a16="http://schemas.microsoft.com/office/drawing/2014/main" id="{00FA7399-506E-884A-B700-F441C229BE70}"/>
+              </a:ext>
+            </a:extLst>
+          </p:cNvPr>
+          <p:cNvSpPr/>
+          <p:nvPr/>
+        </p:nvSpPr>
+        <p:spPr>
+          <a:xfrm>
+            <a:off x="4603814" y="2500058"/>
+            <a:ext cx="901066" cy="968768"/>
+          </a:xfrm>
+          <a:prstGeom prst="can">
+            <a:avLst/>
+          </a:prstGeom>
+        </p:spPr>
+        <p:style>
+          <a:lnRef idx="2">
+            <a:schemeClr val="accent1">
+              <a:shade val="50000"/>
+            </a:schemeClr>
+          </a:lnRef>
+          <a:fillRef idx="1">
+            <a:schemeClr val="accent1"/>
+          </a:fillRef>
+          <a:effectRef idx="0">
+            <a:schemeClr val="accent1"/>
+          </a:effectRef>
+          <a:fontRef idx="minor">
+            <a:schemeClr val="lt1"/>
+          </a:fontRef>
+        </p:style>
+        <p:txBody>
+          <a:bodyPr rtlCol="0" anchor="ctr"/>
+          <a:lstStyle/>
+          <a:p>
+            <a:pPr algn="ctr"/>
+            <a:endParaRPr lang="en-DE"/>
+          </a:p>
+        </p:txBody>
+      </p:sp>
+      <p:cxnSp>
+        <p:nvCxnSpPr>
+          <p:cNvPr id="33" name="Curved Connector 32">
+            <a:extLst>
+              <a:ext uri="{FF2B5EF4-FFF2-40B4-BE49-F238E27FC236}">
+                <a16:creationId xmlns:a16="http://schemas.microsoft.com/office/drawing/2014/main" id="{AABFA0F6-00D9-D740-B6DB-33EFBE55DD91}"/>
+              </a:ext>
+            </a:extLst>
+          </p:cNvPr>
+          <p:cNvCxnSpPr>
+            <a:cxnSpLocks/>
+          </p:cNvCxnSpPr>
+          <p:nvPr/>
+        </p:nvCxnSpPr>
+        <p:spPr>
+          <a:xfrm>
+            <a:off x="4574630" y="2099187"/>
+            <a:ext cx="558666" cy="527207"/>
+          </a:xfrm>
+          <a:prstGeom prst="curvedConnector3">
+            <a:avLst>
+              <a:gd name="adj1" fmla="val 103084"/>
+            </a:avLst>
+          </a:prstGeom>
+          <a:ln w="38100">
+            <a:solidFill>
+              <a:schemeClr val="tx1"/>
+            </a:solidFill>
+            <a:tailEnd type="triangle"/>
+          </a:ln>
+        </p:spPr>
+        <p:style>
+          <a:lnRef idx="1">
+            <a:schemeClr val="accent1"/>
+          </a:lnRef>
+          <a:fillRef idx="0">
+            <a:schemeClr val="accent1"/>
+          </a:fillRef>
+          <a:effectRef idx="0">
+            <a:schemeClr val="accent1"/>
+          </a:effectRef>
+          <a:fontRef idx="minor">
+            <a:schemeClr val="tx1"/>
+          </a:fontRef>
+        </p:style>
+      </p:cxnSp>
+      <p:sp>
+        <p:nvSpPr>
+          <p:cNvPr id="35" name="TextBox 34">
+            <a:extLst>
+              <a:ext uri="{FF2B5EF4-FFF2-40B4-BE49-F238E27FC236}">
+                <a16:creationId xmlns:a16="http://schemas.microsoft.com/office/drawing/2014/main" id="{E4E6C1E2-07FE-1B4F-BD48-7CCDA5D83A31}"/>
+              </a:ext>
+            </a:extLst>
+          </p:cNvPr>
+          <p:cNvSpPr txBox="1"/>
+          <p:nvPr/>
+        </p:nvSpPr>
+        <p:spPr>
+          <a:xfrm>
+            <a:off x="6204101" y="3578126"/>
+            <a:ext cx="2334418" cy="369332"/>
+          </a:xfrm>
+          <a:prstGeom prst="rect">
+            <a:avLst/>
+          </a:prstGeom>
+          <a:noFill/>
+        </p:spPr>
+        <p:txBody>
+          <a:bodyPr wrap="square" rtlCol="0">
+            <a:spAutoFit/>
+          </a:bodyPr>
+          <a:lstStyle/>
+          <a:p>
+            <a:r>
+              <a:rPr lang="en-US" dirty="0" err="1">
+                <a:solidFill>
+                  <a:srgbClr val="00B050"/>
+                </a:solidFill>
+              </a:rPr>
+              <a:t>outputImage</a:t>
+            </a:r>
+            <a:endParaRPr lang="en-DE" dirty="0">
+              <a:solidFill>
+                <a:srgbClr val="00B050"/>
+              </a:solidFill>
+            </a:endParaRPr>
+          </a:p>
+        </p:txBody>
+      </p:sp>
+      <p:cxnSp>
+        <p:nvCxnSpPr>
+          <p:cNvPr id="37" name="Curved Connector 36">
+            <a:extLst>
+              <a:ext uri="{FF2B5EF4-FFF2-40B4-BE49-F238E27FC236}">
+                <a16:creationId xmlns:a16="http://schemas.microsoft.com/office/drawing/2014/main" id="{E2D67DCA-E581-0846-ACBF-423806F72785}"/>
+              </a:ext>
+            </a:extLst>
+          </p:cNvPr>
+          <p:cNvCxnSpPr>
+            <a:cxnSpLocks/>
+            <a:stCxn id="45" idx="3"/>
+            <a:endCxn id="41" idx="1"/>
+          </p:cNvCxnSpPr>
+          <p:nvPr/>
+        </p:nvCxnSpPr>
+        <p:spPr>
+          <a:xfrm>
+            <a:off x="6483613" y="1840821"/>
+            <a:ext cx="412084" cy="495249"/>
+          </a:xfrm>
+          <a:prstGeom prst="curvedConnector2">
+            <a:avLst/>
+          </a:prstGeom>
+          <a:ln w="38100">
+            <a:solidFill>
+              <a:schemeClr val="tx1"/>
+            </a:solidFill>
+            <a:tailEnd type="triangle"/>
+          </a:ln>
+        </p:spPr>
+        <p:style>
+          <a:lnRef idx="1">
+            <a:schemeClr val="accent1"/>
+          </a:lnRef>
+          <a:fillRef idx="0">
+            <a:schemeClr val="accent1"/>
+          </a:fillRef>
+          <a:effectRef idx="0">
+            <a:schemeClr val="accent1"/>
+          </a:effectRef>
+          <a:fontRef idx="minor">
+            <a:schemeClr val="tx1"/>
+          </a:fontRef>
+        </p:style>
+      </p:cxnSp>
+      <p:sp>
+        <p:nvSpPr>
+          <p:cNvPr id="38" name="TextBox 37">
+            <a:extLst>
+              <a:ext uri="{FF2B5EF4-FFF2-40B4-BE49-F238E27FC236}">
+                <a16:creationId xmlns:a16="http://schemas.microsoft.com/office/drawing/2014/main" id="{BB8E10F0-D7CC-0C41-A370-A84A43EA6164}"/>
+              </a:ext>
+            </a:extLst>
+          </p:cNvPr>
+          <p:cNvSpPr txBox="1"/>
+          <p:nvPr/>
+        </p:nvSpPr>
+        <p:spPr>
+          <a:xfrm>
+            <a:off x="3502855" y="1720515"/>
+            <a:ext cx="1760081" cy="369332"/>
+          </a:xfrm>
+          <a:prstGeom prst="rect">
+            <a:avLst/>
+          </a:prstGeom>
+          <a:noFill/>
+        </p:spPr>
+        <p:txBody>
+          <a:bodyPr wrap="square" rtlCol="0">
+            <a:spAutoFit/>
+          </a:bodyPr>
+          <a:lstStyle/>
+          <a:p>
+            <a:r>
+              <a:rPr lang="en-DE" dirty="0">
+                <a:solidFill>
+                  <a:srgbClr val="FF0000"/>
+                </a:solidFill>
+              </a:rPr>
+              <a:t>“Hello world”</a:t>
+            </a:r>
+          </a:p>
+        </p:txBody>
+      </p:sp>
+      <p:sp>
+        <p:nvSpPr>
+          <p:cNvPr id="42" name="Cube 41">
+            <a:extLst>
+              <a:ext uri="{FF2B5EF4-FFF2-40B4-BE49-F238E27FC236}">
+                <a16:creationId xmlns:a16="http://schemas.microsoft.com/office/drawing/2014/main" id="{2B281B5B-F24C-2B4D-A95D-CA45EAAA8086}"/>
+              </a:ext>
+            </a:extLst>
+          </p:cNvPr>
+          <p:cNvSpPr/>
+          <p:nvPr/>
+        </p:nvSpPr>
+        <p:spPr>
+          <a:xfrm>
+            <a:off x="6375269" y="2693739"/>
+            <a:ext cx="1011960" cy="681488"/>
+          </a:xfrm>
+          <a:prstGeom prst="cube">
+            <a:avLst>
+              <a:gd name="adj" fmla="val 30249"/>
+            </a:avLst>
+          </a:prstGeom>
+        </p:spPr>
+        <p:style>
+          <a:lnRef idx="2">
+            <a:schemeClr val="accent1">
+              <a:shade val="50000"/>
+            </a:schemeClr>
+          </a:lnRef>
+          <a:fillRef idx="1">
+            <a:schemeClr val="accent1"/>
+          </a:fillRef>
+          <a:effectRef idx="0">
+            <a:schemeClr val="accent1"/>
+          </a:effectRef>
+          <a:fontRef idx="minor">
+            <a:schemeClr val="lt1"/>
+          </a:fontRef>
+        </p:style>
+        <p:txBody>
+          <a:bodyPr rtlCol="0" anchor="ctr"/>
+          <a:lstStyle/>
+          <a:p>
+            <a:pPr algn="ctr"/>
+            <a:endParaRPr lang="en-DE" dirty="0"/>
+          </a:p>
+        </p:txBody>
+      </p:sp>
+      <p:sp>
+        <p:nvSpPr>
+          <p:cNvPr id="41" name="Can 40">
+            <a:extLst>
+              <a:ext uri="{FF2B5EF4-FFF2-40B4-BE49-F238E27FC236}">
+                <a16:creationId xmlns:a16="http://schemas.microsoft.com/office/drawing/2014/main" id="{F348A407-08BF-AF4C-BA3A-4779FFE07879}"/>
+              </a:ext>
+            </a:extLst>
+          </p:cNvPr>
+          <p:cNvSpPr/>
+          <p:nvPr/>
+        </p:nvSpPr>
+        <p:spPr>
+          <a:xfrm>
+            <a:off x="6562690" y="2336070"/>
+            <a:ext cx="666014" cy="491022"/>
+          </a:xfrm>
+          <a:prstGeom prst="can">
+            <a:avLst/>
+          </a:prstGeom>
+        </p:spPr>
+        <p:style>
+          <a:lnRef idx="2">
+            <a:schemeClr val="accent1">
+              <a:shade val="50000"/>
+            </a:schemeClr>
+          </a:lnRef>
+          <a:fillRef idx="1">
+            <a:schemeClr val="accent1"/>
+          </a:fillRef>
+          <a:effectRef idx="0">
+            <a:schemeClr val="accent1"/>
+          </a:effectRef>
+          <a:fontRef idx="minor">
+            <a:schemeClr val="lt1"/>
+          </a:fontRef>
+        </p:style>
+        <p:txBody>
+          <a:bodyPr rtlCol="0" anchor="ctr"/>
+          <a:lstStyle/>
+          <a:p>
+            <a:pPr algn="ctr"/>
+            <a:endParaRPr lang="en-DE"/>
+          </a:p>
+        </p:txBody>
+      </p:sp>
+      <p:pic>
+        <p:nvPicPr>
+          <p:cNvPr id="45" name="Picture 44">
+            <a:extLst>
+              <a:ext uri="{FF2B5EF4-FFF2-40B4-BE49-F238E27FC236}">
+                <a16:creationId xmlns:a16="http://schemas.microsoft.com/office/drawing/2014/main" id="{BCEC79A2-4B58-8244-AB9B-2218EA70BC87}"/>
+              </a:ext>
+            </a:extLst>
+          </p:cNvPr>
+          <p:cNvPicPr>
+            <a:picLocks noChangeAspect="1"/>
+          </p:cNvPicPr>
+          <p:nvPr/>
+        </p:nvPicPr>
+        <p:blipFill>
+          <a:blip r:embed="rId2"/>
+          <a:stretch>
+            <a:fillRect/>
+          </a:stretch>
+        </p:blipFill>
+        <p:spPr>
+          <a:xfrm>
+            <a:off x="5471653" y="1446724"/>
+            <a:ext cx="1011960" cy="788193"/>
+          </a:xfrm>
+          <a:prstGeom prst="rect">
+            <a:avLst/>
+          </a:prstGeom>
+          <a:ln>
+            <a:solidFill>
+              <a:srgbClr val="FF0000"/>
+            </a:solidFill>
+          </a:ln>
+        </p:spPr>
+      </p:pic>
+      <p:graphicFrame>
+        <p:nvGraphicFramePr>
+          <p:cNvPr id="46" name="Table 46">
+            <a:extLst>
+              <a:ext uri="{FF2B5EF4-FFF2-40B4-BE49-F238E27FC236}">
+                <a16:creationId xmlns:a16="http://schemas.microsoft.com/office/drawing/2014/main" id="{91F2471C-B3A4-6D4C-8AF4-8F5BB7E2B955}"/>
+              </a:ext>
+            </a:extLst>
+          </p:cNvPr>
+          <p:cNvGraphicFramePr>
+            <a:graphicFrameLocks noGrp="1"/>
+          </p:cNvGraphicFramePr>
+          <p:nvPr>
+            <p:extLst>
+              <p:ext uri="{D42A27DB-BD31-4B8C-83A1-F6EECF244321}">
+                <p14:modId xmlns:p14="http://schemas.microsoft.com/office/powerpoint/2010/main" val="816299542"/>
+              </p:ext>
+            </p:extLst>
+          </p:nvPr>
+        </p:nvGraphicFramePr>
+        <p:xfrm>
+          <a:off x="1351638" y="4212599"/>
+          <a:ext cx="8306484" cy="1483360"/>
+        </p:xfrm>
+        <a:graphic>
+          <a:graphicData uri="http://schemas.openxmlformats.org/drawingml/2006/table">
+            <a:tbl>
+              <a:tblPr firstRow="1" bandRow="1">
+                <a:tableStyleId>{93296810-A885-4BE3-A3E7-6D5BEEA58F35}</a:tableStyleId>
+              </a:tblPr>
+              <a:tblGrid>
+                <a:gridCol w="3097380">
+                  <a:extLst>
+                    <a:ext uri="{9D8B030D-6E8A-4147-A177-3AD203B41FA5}">
+                      <a16:colId xmlns:a16="http://schemas.microsoft.com/office/drawing/2014/main" val="3518303700"/>
+                    </a:ext>
+                  </a:extLst>
+                </a:gridCol>
+                <a:gridCol w="2372463">
+                  <a:extLst>
+                    <a:ext uri="{9D8B030D-6E8A-4147-A177-3AD203B41FA5}">
+                      <a16:colId xmlns:a16="http://schemas.microsoft.com/office/drawing/2014/main" val="871865592"/>
+                    </a:ext>
+                  </a:extLst>
+                </a:gridCol>
+                <a:gridCol w="2836641">
+                  <a:extLst>
+                    <a:ext uri="{9D8B030D-6E8A-4147-A177-3AD203B41FA5}">
+                      <a16:colId xmlns:a16="http://schemas.microsoft.com/office/drawing/2014/main" val="2127570093"/>
+                    </a:ext>
+                  </a:extLst>
+                </a:gridCol>
+              </a:tblGrid>
+              <a:tr h="370840">
+                <a:tc>
+                  <a:txBody>
+                    <a:bodyPr/>
+                    <a:lstStyle/>
+                    <a:p>
+                      <a:r>
+                        <a:rPr lang="en-DE" sz="1600" dirty="0"/>
+                        <a:t>Naming convention for variables</a:t>
+                      </a:r>
+                    </a:p>
+                  </a:txBody>
+                  <a:tcPr/>
+                </a:tc>
+                <a:tc>
+                  <a:txBody>
+                    <a:bodyPr/>
+                    <a:lstStyle/>
+                    <a:p>
+                      <a:r>
+                        <a:rPr lang="en-DE" sz="1600" dirty="0"/>
+                        <a:t>Example</a:t>
+                      </a:r>
+                    </a:p>
+                  </a:txBody>
+                  <a:tcPr/>
+                </a:tc>
+                <a:tc>
+                  <a:txBody>
+                    <a:bodyPr/>
+                    <a:lstStyle/>
+                    <a:p>
+                      <a:r>
+                        <a:rPr lang="en-DE" sz="1600" dirty="0"/>
+                        <a:t>Language</a:t>
+                      </a:r>
+                    </a:p>
+                  </a:txBody>
+                  <a:tcPr/>
+                </a:tc>
+                <a:extLst>
+                  <a:ext uri="{0D108BD9-81ED-4DB2-BD59-A6C34878D82A}">
+                    <a16:rowId xmlns:a16="http://schemas.microsoft.com/office/drawing/2014/main" val="99714180"/>
+                  </a:ext>
+                </a:extLst>
+              </a:tr>
+              <a:tr h="370840">
+                <a:tc>
+                  <a:txBody>
+                    <a:bodyPr/>
+                    <a:lstStyle/>
+                    <a:p>
+                      <a:r>
+                        <a:rPr lang="en-DE" sz="1600" dirty="0"/>
+                        <a:t>camelCase (starts lowercase)</a:t>
+                      </a:r>
+                    </a:p>
+                  </a:txBody>
+                  <a:tcPr/>
+                </a:tc>
+                <a:tc>
+                  <a:txBody>
+                    <a:bodyPr/>
+                    <a:lstStyle/>
+                    <a:p>
+                      <a:r>
+                        <a:rPr lang="en-DE" sz="1600" dirty="0"/>
+                        <a:t>myVariableName</a:t>
+                      </a:r>
+                    </a:p>
+                  </a:txBody>
+                  <a:tcPr/>
+                </a:tc>
+                <a:tc>
+                  <a:txBody>
+                    <a:bodyPr/>
+                    <a:lstStyle/>
+                    <a:p>
+                      <a:r>
+                        <a:rPr lang="en-DE" sz="1600" dirty="0"/>
+                        <a:t>Java, Groovy, ImageJ Macro</a:t>
+                      </a:r>
+                    </a:p>
+                  </a:txBody>
+                  <a:tcPr/>
+                </a:tc>
+                <a:extLst>
+                  <a:ext uri="{0D108BD9-81ED-4DB2-BD59-A6C34878D82A}">
+                    <a16:rowId xmlns:a16="http://schemas.microsoft.com/office/drawing/2014/main" val="756143893"/>
+                  </a:ext>
+                </a:extLst>
+              </a:tr>
+              <a:tr h="370840">
+                <a:tc>
+                  <a:txBody>
+                    <a:bodyPr/>
+                    <a:lstStyle/>
+                    <a:p>
+                      <a:r>
+                        <a:rPr lang="en-GB" sz="1600" dirty="0"/>
+                        <a:t>s</a:t>
+                      </a:r>
+                      <a:r>
+                        <a:rPr lang="en-DE" sz="1600" dirty="0"/>
+                        <a:t>nake_case (</a:t>
+                      </a:r>
+                      <a:r>
+                        <a:rPr lang="en-GB" sz="1600" dirty="0"/>
+                        <a:t>s</a:t>
+                      </a:r>
+                      <a:r>
+                        <a:rPr lang="en-DE" sz="1600" dirty="0"/>
+                        <a:t>tarts lowercase)</a:t>
+                      </a:r>
+                    </a:p>
+                  </a:txBody>
+                  <a:tcPr/>
+                </a:tc>
+                <a:tc>
+                  <a:txBody>
+                    <a:bodyPr/>
+                    <a:lstStyle/>
+                    <a:p>
+                      <a:r>
+                        <a:rPr lang="en-GB" sz="1600" dirty="0"/>
+                        <a:t>m</a:t>
+                      </a:r>
+                      <a:r>
+                        <a:rPr lang="en-DE" sz="1600" dirty="0"/>
+                        <a:t>y_variable_name</a:t>
+                      </a:r>
+                    </a:p>
+                  </a:txBody>
+                  <a:tcPr/>
+                </a:tc>
+                <a:tc>
+                  <a:txBody>
+                    <a:bodyPr/>
+                    <a:lstStyle/>
+                    <a:p>
+                      <a:r>
+                        <a:rPr lang="en-DE" sz="1600" dirty="0"/>
+                        <a:t>Python</a:t>
+                      </a:r>
+                    </a:p>
+                  </a:txBody>
+                  <a:tcPr/>
+                </a:tc>
+                <a:extLst>
+                  <a:ext uri="{0D108BD9-81ED-4DB2-BD59-A6C34878D82A}">
+                    <a16:rowId xmlns:a16="http://schemas.microsoft.com/office/drawing/2014/main" val="2948251099"/>
+                  </a:ext>
+                </a:extLst>
+              </a:tr>
+              <a:tr h="370840">
+                <a:tc gridSpan="3">
+                  <a:txBody>
+                    <a:bodyPr/>
+                    <a:lstStyle/>
+                    <a:p>
+                      <a:pPr algn="ctr"/>
+                      <a:r>
+                        <a:rPr lang="en-DE" sz="1600" dirty="0"/>
+                        <a:t>… there are naming conventions to name classes, constants, ….</a:t>
+                      </a:r>
+                    </a:p>
+                  </a:txBody>
+                  <a:tcPr/>
+                </a:tc>
+                <a:tc hMerge="1">
+                  <a:txBody>
+                    <a:bodyPr/>
+                    <a:lstStyle/>
+                    <a:p>
+                      <a:r>
+                        <a:rPr lang="en-DE" dirty="0"/>
+                        <a:t>More conventions depending if you declare a class, a constant, ….</a:t>
+                      </a:r>
+                    </a:p>
+                  </a:txBody>
+                  <a:tcPr/>
+                </a:tc>
+                <a:tc hMerge="1">
+                  <a:txBody>
+                    <a:bodyPr/>
+                    <a:lstStyle/>
+                    <a:p>
+                      <a:endParaRPr lang="en-DE" dirty="0"/>
+                    </a:p>
+                  </a:txBody>
+                  <a:tcPr/>
+                </a:tc>
+                <a:extLst>
+                  <a:ext uri="{0D108BD9-81ED-4DB2-BD59-A6C34878D82A}">
+                    <a16:rowId xmlns:a16="http://schemas.microsoft.com/office/drawing/2014/main" val="973285732"/>
+                  </a:ext>
+                </a:extLst>
+              </a:tr>
+            </a:tbl>
+          </a:graphicData>
+        </a:graphic>
+      </p:graphicFrame>
+    </p:spTree>
+    <p:extLst>
+      <p:ext uri="{BB962C8B-B14F-4D97-AF65-F5344CB8AC3E}">
+        <p14:creationId xmlns:p14="http://schemas.microsoft.com/office/powerpoint/2010/main" val="1690279339"/>
+      </p:ext>
+    </p:extLst>
+  </p:cSld>
+  <p:clrMapOvr>
+    <a:masterClrMapping/>
+  </p:clrMapOvr>
+</p:sld>
+</file>
+
+<file path=ppt/slides/slide2.xml><?xml version="1.0" encoding="utf-8"?>
 <p:sld xmlns:a="http://schemas.openxmlformats.org/drawingml/2006/main" xmlns:r="http://schemas.openxmlformats.org/officeDocument/2006/relationships" xmlns:p="http://schemas.openxmlformats.org/presentationml/2006/main">
   <p:cSld>
     <p:spTree>

</xml_diff>